<commit_message>
Flag presentation - added slide about loopback
</commit_message>
<xml_diff>
--- a/presentations/ippm-ioam-flags-ietf 108.pptx
+++ b/presentations/ippm-ioam-flags-ietf 108.pptx
@@ -5,11 +5,12 @@
     <p:sldMasterId id="2147483648" r:id="rId1"/>
   </p:sldMasterIdLst>
   <p:notesMasterIdLst>
-    <p:notesMasterId r:id="rId4"/>
+    <p:notesMasterId r:id="rId5"/>
   </p:notesMasterIdLst>
   <p:sldIdLst>
     <p:sldId id="256" r:id="rId2"/>
     <p:sldId id="258" r:id="rId3"/>
+    <p:sldId id="259" r:id="rId4"/>
   </p:sldIdLst>
   <p:sldSz cx="12192000" cy="6858000"/>
   <p:notesSz cx="6858000" cy="9144000"/>
@@ -198,7 +199,7 @@
           <a:p>
             <a:fld id="{DA61E454-4459-4E76-83EF-D0281D0657F0}" type="datetimeFigureOut">
               <a:rPr lang="en-US" smtClean="0"/>
-              <a:t>7/21/2020</a:t>
+              <a:t>7/22/2020</a:t>
             </a:fld>
             <a:endParaRPr lang="en-US"/>
           </a:p>
@@ -594,7 +595,7 @@
           <a:p>
             <a:fld id="{8A8963D3-5943-4DCA-811D-32E3858FDEB1}" type="datetime1">
               <a:rPr lang="en-US" smtClean="0"/>
-              <a:t>7/21/2020</a:t>
+              <a:t>7/22/2020</a:t>
             </a:fld>
             <a:endParaRPr lang="en-US"/>
           </a:p>
@@ -762,7 +763,7 @@
           <a:p>
             <a:fld id="{DC1921A9-0AD7-48DD-A079-6AC13E5F9399}" type="datetime1">
               <a:rPr lang="en-US" smtClean="0"/>
-              <a:t>7/21/2020</a:t>
+              <a:t>7/22/2020</a:t>
             </a:fld>
             <a:endParaRPr lang="en-US"/>
           </a:p>
@@ -940,7 +941,7 @@
           <a:p>
             <a:fld id="{8614E834-ABC4-45B8-8C86-CA6E8E6CD0CE}" type="datetime1">
               <a:rPr lang="en-US" smtClean="0"/>
-              <a:t>7/21/2020</a:t>
+              <a:t>7/22/2020</a:t>
             </a:fld>
             <a:endParaRPr lang="en-US"/>
           </a:p>
@@ -1108,7 +1109,7 @@
           <a:p>
             <a:fld id="{44082BEB-F9A6-4DA4-9508-53612AD13837}" type="datetime1">
               <a:rPr lang="en-US" smtClean="0"/>
-              <a:t>7/21/2020</a:t>
+              <a:t>7/22/2020</a:t>
             </a:fld>
             <a:endParaRPr lang="en-US"/>
           </a:p>
@@ -1353,7 +1354,7 @@
           <a:p>
             <a:fld id="{A86BD59C-A0C1-4266-83EE-C322A7424133}" type="datetime1">
               <a:rPr lang="en-US" smtClean="0"/>
-              <a:t>7/21/2020</a:t>
+              <a:t>7/22/2020</a:t>
             </a:fld>
             <a:endParaRPr lang="en-US"/>
           </a:p>
@@ -1582,7 +1583,7 @@
           <a:p>
             <a:fld id="{7CEB75FD-9233-46C6-B49F-9C167404F0CF}" type="datetime1">
               <a:rPr lang="en-US" smtClean="0"/>
-              <a:t>7/21/2020</a:t>
+              <a:t>7/22/2020</a:t>
             </a:fld>
             <a:endParaRPr lang="en-US"/>
           </a:p>
@@ -1946,7 +1947,7 @@
           <a:p>
             <a:fld id="{408A7789-D3D4-49F6-8D08-1BF95690CB9A}" type="datetime1">
               <a:rPr lang="en-US" smtClean="0"/>
-              <a:t>7/21/2020</a:t>
+              <a:t>7/22/2020</a:t>
             </a:fld>
             <a:endParaRPr lang="en-US"/>
           </a:p>
@@ -2063,7 +2064,7 @@
           <a:p>
             <a:fld id="{BBA8B7E7-02AB-4C99-81B2-30536AF277FF}" type="datetime1">
               <a:rPr lang="en-US" smtClean="0"/>
-              <a:t>7/21/2020</a:t>
+              <a:t>7/22/2020</a:t>
             </a:fld>
             <a:endParaRPr lang="en-US"/>
           </a:p>
@@ -2158,7 +2159,7 @@
           <a:p>
             <a:fld id="{6A21E02D-5020-4F3C-AF40-3CD1F65E3224}" type="datetime1">
               <a:rPr lang="en-US" smtClean="0"/>
-              <a:t>7/21/2020</a:t>
+              <a:t>7/22/2020</a:t>
             </a:fld>
             <a:endParaRPr lang="en-US"/>
           </a:p>
@@ -2433,7 +2434,7 @@
           <a:p>
             <a:fld id="{6E1C4B30-B59A-4042-996E-51FC308A90F1}" type="datetime1">
               <a:rPr lang="en-US" smtClean="0"/>
-              <a:t>7/21/2020</a:t>
+              <a:t>7/22/2020</a:t>
             </a:fld>
             <a:endParaRPr lang="en-US"/>
           </a:p>
@@ -2685,7 +2686,7 @@
           <a:p>
             <a:fld id="{BB0621CC-1F88-49B0-92FB-D459BBDE58D0}" type="datetime1">
               <a:rPr lang="en-US" smtClean="0"/>
-              <a:t>7/21/2020</a:t>
+              <a:t>7/22/2020</a:t>
             </a:fld>
             <a:endParaRPr lang="en-US"/>
           </a:p>
@@ -2896,7 +2897,7 @@
           <a:p>
             <a:fld id="{B8ED6371-AB5E-4637-978D-27859975EFA4}" type="datetime1">
               <a:rPr lang="en-US" smtClean="0"/>
-              <a:t>7/21/2020</a:t>
+              <a:t>7/22/2020</a:t>
             </a:fld>
             <a:endParaRPr lang="en-US"/>
           </a:p>
@@ -3804,6 +3805,364 @@
     <p:extLst>
       <p:ext uri="{BB962C8B-B14F-4D97-AF65-F5344CB8AC3E}">
         <p14:creationId xmlns:p14="http://schemas.microsoft.com/office/powerpoint/2010/main" val="1630011681"/>
+      </p:ext>
+    </p:extLst>
+  </p:cSld>
+  <p:clrMapOvr>
+    <a:masterClrMapping/>
+  </p:clrMapOvr>
+</p:sld>
+</file>
+
+<file path=ppt/slides/slide3.xml><?xml version="1.0" encoding="utf-8"?>
+<p:sld xmlns:a="http://schemas.openxmlformats.org/drawingml/2006/main" xmlns:r="http://schemas.openxmlformats.org/officeDocument/2006/relationships" xmlns:p="http://schemas.openxmlformats.org/presentationml/2006/main">
+  <p:cSld>
+    <p:spTree>
+      <p:nvGrpSpPr>
+        <p:cNvPr id="1" name=""/>
+        <p:cNvGrpSpPr/>
+        <p:nvPr/>
+      </p:nvGrpSpPr>
+      <p:grpSpPr>
+        <a:xfrm>
+          <a:off x="0" y="0"/>
+          <a:ext cx="0" cy="0"/>
+          <a:chOff x="0" y="0"/>
+          <a:chExt cx="0" cy="0"/>
+        </a:xfrm>
+      </p:grpSpPr>
+      <p:sp>
+        <p:nvSpPr>
+          <p:cNvPr id="2" name="Title 1"/>
+          <p:cNvSpPr>
+            <a:spLocks noGrp="1"/>
+          </p:cNvSpPr>
+          <p:nvPr>
+            <p:ph type="title"/>
+          </p:nvPr>
+        </p:nvSpPr>
+        <p:spPr/>
+        <p:txBody>
+          <a:bodyPr/>
+          <a:lstStyle/>
+          <a:p>
+            <a:r>
+              <a:rPr lang="en-US" dirty="0"/>
+              <a:t>Open Issue – Loopback Flag</a:t>
+            </a:r>
+          </a:p>
+        </p:txBody>
+      </p:sp>
+      <p:sp>
+        <p:nvSpPr>
+          <p:cNvPr id="4" name="Content Placeholder 2"/>
+          <p:cNvSpPr txBox="1">
+            <a:spLocks/>
+          </p:cNvSpPr>
+          <p:nvPr/>
+        </p:nvSpPr>
+        <p:spPr>
+          <a:xfrm>
+            <a:off x="981456" y="1914009"/>
+            <a:ext cx="10515600" cy="4351338"/>
+          </a:xfrm>
+          <a:prstGeom prst="rect">
+            <a:avLst/>
+          </a:prstGeom>
+        </p:spPr>
+        <p:txBody>
+          <a:bodyPr vert="horz" lIns="91440" tIns="45720" rIns="91440" bIns="45720" rtlCol="0">
+            <a:normAutofit/>
+          </a:bodyPr>
+          <a:lstStyle>
+            <a:lvl1pPr marL="228600" indent="-228600" algn="l" defTabSz="914400" rtl="0" eaLnBrk="1" latinLnBrk="0" hangingPunct="1">
+              <a:lnSpc>
+                <a:spcPct val="90000"/>
+              </a:lnSpc>
+              <a:spcBef>
+                <a:spcPts val="1000"/>
+              </a:spcBef>
+              <a:buFont typeface="Arial" panose="020B0604020202020204" pitchFamily="34" charset="0"/>
+              <a:buChar char="•"/>
+              <a:defRPr sz="2800" kern="1200">
+                <a:solidFill>
+                  <a:schemeClr val="tx1"/>
+                </a:solidFill>
+                <a:latin typeface="+mn-lt"/>
+                <a:ea typeface="+mn-ea"/>
+                <a:cs typeface="+mn-cs"/>
+              </a:defRPr>
+            </a:lvl1pPr>
+            <a:lvl2pPr marL="685800" indent="-228600" algn="l" defTabSz="914400" rtl="0" eaLnBrk="1" latinLnBrk="0" hangingPunct="1">
+              <a:lnSpc>
+                <a:spcPct val="90000"/>
+              </a:lnSpc>
+              <a:spcBef>
+                <a:spcPts val="500"/>
+              </a:spcBef>
+              <a:buFont typeface="Arial" panose="020B0604020202020204" pitchFamily="34" charset="0"/>
+              <a:buChar char="•"/>
+              <a:defRPr sz="2400" kern="1200">
+                <a:solidFill>
+                  <a:schemeClr val="tx1"/>
+                </a:solidFill>
+                <a:latin typeface="+mn-lt"/>
+                <a:ea typeface="+mn-ea"/>
+                <a:cs typeface="+mn-cs"/>
+              </a:defRPr>
+            </a:lvl2pPr>
+            <a:lvl3pPr marL="1143000" indent="-228600" algn="l" defTabSz="914400" rtl="0" eaLnBrk="1" latinLnBrk="0" hangingPunct="1">
+              <a:lnSpc>
+                <a:spcPct val="90000"/>
+              </a:lnSpc>
+              <a:spcBef>
+                <a:spcPts val="500"/>
+              </a:spcBef>
+              <a:buFont typeface="Arial" panose="020B0604020202020204" pitchFamily="34" charset="0"/>
+              <a:buChar char="•"/>
+              <a:defRPr sz="2000" kern="1200">
+                <a:solidFill>
+                  <a:schemeClr val="tx1"/>
+                </a:solidFill>
+                <a:latin typeface="+mn-lt"/>
+                <a:ea typeface="+mn-ea"/>
+                <a:cs typeface="+mn-cs"/>
+              </a:defRPr>
+            </a:lvl3pPr>
+            <a:lvl4pPr marL="1600200" indent="-228600" algn="l" defTabSz="914400" rtl="0" eaLnBrk="1" latinLnBrk="0" hangingPunct="1">
+              <a:lnSpc>
+                <a:spcPct val="90000"/>
+              </a:lnSpc>
+              <a:spcBef>
+                <a:spcPts val="500"/>
+              </a:spcBef>
+              <a:buFont typeface="Arial" panose="020B0604020202020204" pitchFamily="34" charset="0"/>
+              <a:buChar char="•"/>
+              <a:defRPr sz="1800" kern="1200">
+                <a:solidFill>
+                  <a:schemeClr val="tx1"/>
+                </a:solidFill>
+                <a:latin typeface="+mn-lt"/>
+                <a:ea typeface="+mn-ea"/>
+                <a:cs typeface="+mn-cs"/>
+              </a:defRPr>
+            </a:lvl4pPr>
+            <a:lvl5pPr marL="2057400" indent="-228600" algn="l" defTabSz="914400" rtl="0" eaLnBrk="1" latinLnBrk="0" hangingPunct="1">
+              <a:lnSpc>
+                <a:spcPct val="90000"/>
+              </a:lnSpc>
+              <a:spcBef>
+                <a:spcPts val="500"/>
+              </a:spcBef>
+              <a:buFont typeface="Arial" panose="020B0604020202020204" pitchFamily="34" charset="0"/>
+              <a:buChar char="•"/>
+              <a:defRPr sz="1800" kern="1200">
+                <a:solidFill>
+                  <a:schemeClr val="tx1"/>
+                </a:solidFill>
+                <a:latin typeface="+mn-lt"/>
+                <a:ea typeface="+mn-ea"/>
+                <a:cs typeface="+mn-cs"/>
+              </a:defRPr>
+            </a:lvl5pPr>
+            <a:lvl6pPr marL="2514600" indent="-228600" algn="l" defTabSz="914400" rtl="0" eaLnBrk="1" latinLnBrk="0" hangingPunct="1">
+              <a:lnSpc>
+                <a:spcPct val="90000"/>
+              </a:lnSpc>
+              <a:spcBef>
+                <a:spcPts val="500"/>
+              </a:spcBef>
+              <a:buFont typeface="Arial" panose="020B0604020202020204" pitchFamily="34" charset="0"/>
+              <a:buChar char="•"/>
+              <a:defRPr sz="1800" kern="1200">
+                <a:solidFill>
+                  <a:schemeClr val="tx1"/>
+                </a:solidFill>
+                <a:latin typeface="+mn-lt"/>
+                <a:ea typeface="+mn-ea"/>
+                <a:cs typeface="+mn-cs"/>
+              </a:defRPr>
+            </a:lvl6pPr>
+            <a:lvl7pPr marL="2971800" indent="-228600" algn="l" defTabSz="914400" rtl="0" eaLnBrk="1" latinLnBrk="0" hangingPunct="1">
+              <a:lnSpc>
+                <a:spcPct val="90000"/>
+              </a:lnSpc>
+              <a:spcBef>
+                <a:spcPts val="500"/>
+              </a:spcBef>
+              <a:buFont typeface="Arial" panose="020B0604020202020204" pitchFamily="34" charset="0"/>
+              <a:buChar char="•"/>
+              <a:defRPr sz="1800" kern="1200">
+                <a:solidFill>
+                  <a:schemeClr val="tx1"/>
+                </a:solidFill>
+                <a:latin typeface="+mn-lt"/>
+                <a:ea typeface="+mn-ea"/>
+                <a:cs typeface="+mn-cs"/>
+              </a:defRPr>
+            </a:lvl7pPr>
+            <a:lvl8pPr marL="3429000" indent="-228600" algn="l" defTabSz="914400" rtl="0" eaLnBrk="1" latinLnBrk="0" hangingPunct="1">
+              <a:lnSpc>
+                <a:spcPct val="90000"/>
+              </a:lnSpc>
+              <a:spcBef>
+                <a:spcPts val="500"/>
+              </a:spcBef>
+              <a:buFont typeface="Arial" panose="020B0604020202020204" pitchFamily="34" charset="0"/>
+              <a:buChar char="•"/>
+              <a:defRPr sz="1800" kern="1200">
+                <a:solidFill>
+                  <a:schemeClr val="tx1"/>
+                </a:solidFill>
+                <a:latin typeface="+mn-lt"/>
+                <a:ea typeface="+mn-ea"/>
+                <a:cs typeface="+mn-cs"/>
+              </a:defRPr>
+            </a:lvl8pPr>
+            <a:lvl9pPr marL="3886200" indent="-228600" algn="l" defTabSz="914400" rtl="0" eaLnBrk="1" latinLnBrk="0" hangingPunct="1">
+              <a:lnSpc>
+                <a:spcPct val="90000"/>
+              </a:lnSpc>
+              <a:spcBef>
+                <a:spcPts val="500"/>
+              </a:spcBef>
+              <a:buFont typeface="Arial" panose="020B0604020202020204" pitchFamily="34" charset="0"/>
+              <a:buChar char="•"/>
+              <a:defRPr sz="1800" kern="1200">
+                <a:solidFill>
+                  <a:schemeClr val="tx1"/>
+                </a:solidFill>
+                <a:latin typeface="+mn-lt"/>
+                <a:ea typeface="+mn-ea"/>
+                <a:cs typeface="+mn-cs"/>
+              </a:defRPr>
+            </a:lvl9pPr>
+          </a:lstStyle>
+          <a:p>
+            <a:pPr marL="0" indent="0">
+              <a:buNone/>
+            </a:pPr>
+            <a:r>
+              <a:rPr lang="en-US" dirty="0"/>
+              <a:t>Loopback on the reverse path:</a:t>
+            </a:r>
+          </a:p>
+          <a:p>
+            <a:pPr lvl="1"/>
+            <a:r>
+              <a:rPr lang="en-US" dirty="0"/>
+              <a:t>Pushing IOAM data on the reverse path is not necessary.</a:t>
+            </a:r>
+          </a:p>
+          <a:p>
+            <a:pPr lvl="1"/>
+            <a:endParaRPr lang="en-US" dirty="0"/>
+          </a:p>
+          <a:p>
+            <a:pPr lvl="1"/>
+            <a:r>
+              <a:rPr lang="en-US" dirty="0"/>
+              <a:t>Problem: how do transit nodes know that a looped back packet is in transit on the reverse path?</a:t>
+            </a:r>
+          </a:p>
+          <a:p>
+            <a:pPr lvl="1"/>
+            <a:endParaRPr lang="en-US" dirty="0"/>
+          </a:p>
+          <a:p>
+            <a:pPr lvl="2"/>
+            <a:r>
+              <a:rPr lang="en-US" dirty="0"/>
+              <a:t>New flag?</a:t>
+            </a:r>
+          </a:p>
+          <a:p>
+            <a:pPr lvl="2"/>
+            <a:r>
+              <a:rPr lang="en-US" dirty="0"/>
+              <a:t>New IOAM type?</a:t>
+            </a:r>
+          </a:p>
+          <a:p>
+            <a:pPr lvl="2"/>
+            <a:r>
+              <a:rPr lang="en-US" dirty="0"/>
+              <a:t>Clearing the </a:t>
+            </a:r>
+            <a:r>
+              <a:rPr lang="en-US" dirty="0" err="1"/>
+              <a:t>RemainingLen</a:t>
+            </a:r>
+            <a:r>
+              <a:rPr lang="en-US" dirty="0"/>
+              <a:t> field when the packet is looped back?</a:t>
+            </a:r>
+          </a:p>
+        </p:txBody>
+      </p:sp>
+      <p:sp>
+        <p:nvSpPr>
+          <p:cNvPr id="6" name="TextBox 5"/>
+          <p:cNvSpPr txBox="1"/>
+          <p:nvPr/>
+        </p:nvSpPr>
+        <p:spPr>
+          <a:xfrm>
+            <a:off x="4033381" y="6488668"/>
+            <a:ext cx="4133589" cy="369332"/>
+          </a:xfrm>
+          <a:prstGeom prst="rect">
+            <a:avLst/>
+          </a:prstGeom>
+          <a:noFill/>
+        </p:spPr>
+        <p:txBody>
+          <a:bodyPr wrap="square" rtlCol="0">
+            <a:spAutoFit/>
+          </a:bodyPr>
+          <a:lstStyle/>
+          <a:p>
+            <a:pPr algn="ctr"/>
+            <a:r>
+              <a:rPr lang="en-US" dirty="0">
+                <a:solidFill>
+                  <a:schemeClr val="bg1">
+                    <a:lumMod val="50000"/>
+                  </a:schemeClr>
+                </a:solidFill>
+              </a:rPr>
+              <a:t>IETF 108, IPPM, July 2020</a:t>
+            </a:r>
+          </a:p>
+        </p:txBody>
+      </p:sp>
+      <p:sp>
+        <p:nvSpPr>
+          <p:cNvPr id="7" name="Slide Number Placeholder 6"/>
+          <p:cNvSpPr>
+            <a:spLocks noGrp="1"/>
+          </p:cNvSpPr>
+          <p:nvPr>
+            <p:ph type="sldNum" sz="quarter" idx="12"/>
+          </p:nvPr>
+        </p:nvSpPr>
+        <p:spPr/>
+        <p:txBody>
+          <a:bodyPr/>
+          <a:lstStyle/>
+          <a:p>
+            <a:fld id="{5F24DECC-5776-45FE-A1F8-864179D59757}" type="slidenum">
+              <a:rPr lang="en-US" smtClean="0"/>
+              <a:t>3</a:t>
+            </a:fld>
+            <a:endParaRPr lang="en-US"/>
+          </a:p>
+        </p:txBody>
+      </p:sp>
+    </p:spTree>
+    <p:extLst>
+      <p:ext uri="{BB962C8B-B14F-4D97-AF65-F5344CB8AC3E}">
+        <p14:creationId xmlns:p14="http://schemas.microsoft.com/office/powerpoint/2010/main" val="1703599469"/>
       </p:ext>
     </p:extLst>
   </p:cSld>

</xml_diff>